<commit_message>
Updated HDInsight CLuster Types slide screenshot
</commit_message>
<xml_diff>
--- a/Content/HDInsight/Azure HDInsight.pptx
+++ b/Content/HDInsight/Azure HDInsight.pptx
@@ -218,7 +218,7 @@
           <a:p>
             <a:fld id="{2E5CA586-3557-4985-BCD4-35EF5AC8B4A4}" type="datetimeFigureOut">
               <a:rPr lang="en-US" smtClean="0"/>
-              <a:t>5/27/2016</a:t>
+              <a:t>10/10/2016</a:t>
             </a:fld>
             <a:endParaRPr lang="en-US"/>
           </a:p>
@@ -282,38 +282,37 @@
           <a:p>
             <a:pPr lvl="0"/>
             <a:r>
-              <a:rPr lang="en-US" smtClean="0"/>
+              <a:rPr lang="en-US"/>
               <a:t>Click to edit Master text styles</a:t>
             </a:r>
           </a:p>
           <a:p>
             <a:pPr lvl="1"/>
             <a:r>
-              <a:rPr lang="en-US" smtClean="0"/>
+              <a:rPr lang="en-US"/>
               <a:t>Second level</a:t>
             </a:r>
           </a:p>
           <a:p>
             <a:pPr lvl="2"/>
             <a:r>
-              <a:rPr lang="en-US" smtClean="0"/>
+              <a:rPr lang="en-US"/>
               <a:t>Third level</a:t>
             </a:r>
           </a:p>
           <a:p>
             <a:pPr lvl="3"/>
             <a:r>
-              <a:rPr lang="en-US" smtClean="0"/>
+              <a:rPr lang="en-US"/>
               <a:t>Fourth level</a:t>
             </a:r>
           </a:p>
           <a:p>
             <a:pPr lvl="4"/>
             <a:r>
-              <a:rPr lang="en-US" smtClean="0"/>
+              <a:rPr lang="en-US"/>
               <a:t>Fifth level</a:t>
             </a:r>
-            <a:endParaRPr lang="en-US"/>
           </a:p>
         </p:txBody>
       </p:sp>
@@ -615,20 +614,20 @@
           <a:lstStyle/>
           <a:p>
             <a:r>
-              <a:rPr lang="en-US" dirty="0" smtClean="0"/>
+              <a:rPr lang="en-US" dirty="0"/>
               <a:t>Apache Hive is a data warehouse infrastructure built on top of Hadoop for providing data summarization, query, and analysis. Initially developed by Facebook, Apache Hive is now used and developed by other companies such as Netflix. Amazon maintains a software fork of Apache Hive that is included in Amazon Elastic MapReduce on Amazon Web Services</a:t>
             </a:r>
           </a:p>
           <a:p>
-            <a:endParaRPr lang="en-US" dirty="0" smtClean="0"/>
-          </a:p>
-          <a:p>
-            <a:r>
-              <a:rPr lang="en-US" dirty="0" smtClean="0"/>
+            <a:endParaRPr lang="en-US" dirty="0"/>
+          </a:p>
+          <a:p>
+            <a:r>
+              <a:rPr lang="en-US" dirty="0"/>
               <a:t>NOTE: Removed “Linux and Windows because of Spark’s decision to remove Windows support.  Probably worth</a:t>
             </a:r>
             <a:r>
-              <a:rPr lang="en-US" baseline="0" dirty="0" smtClean="0"/>
+              <a:rPr lang="en-US" baseline="0" dirty="0"/>
               <a:t> de-emphasizing the OS and instead focusing on the HDI platforms offered.</a:t>
             </a:r>
             <a:endParaRPr lang="en-US" dirty="0"/>
@@ -716,33 +715,33 @@
           <a:lstStyle/>
           <a:p>
             <a:r>
-              <a:rPr lang="en-US" dirty="0" smtClean="0"/>
+              <a:rPr lang="en-US" dirty="0"/>
               <a:t>Source: https://azure.microsoft.com/en-us/documentation/articles/hdinsight-hadoop-introduction/ (Advantages of Hadoop in the Cloud)</a:t>
             </a:r>
           </a:p>
           <a:p>
-            <a:endParaRPr lang="en-US" dirty="0" smtClean="0"/>
-          </a:p>
-          <a:p>
-            <a:r>
-              <a:rPr lang="en-US" dirty="0" smtClean="0"/>
+            <a:endParaRPr lang="en-US" dirty="0"/>
+          </a:p>
+          <a:p>
+            <a:r>
+              <a:rPr lang="en-US" dirty="0"/>
               <a:t>What would it take for YOU to manage a 500-node cluster?</a:t>
             </a:r>
             <a:r>
-              <a:rPr lang="en-US" baseline="0" dirty="0" smtClean="0"/>
+              <a:rPr lang="en-US" baseline="0" dirty="0"/>
               <a:t>  How many resources, how much work in checking node health, </a:t>
             </a:r>
             <a:r>
-              <a:rPr lang="en-US" baseline="0" dirty="0" err="1" smtClean="0"/>
+              <a:rPr lang="en-US" baseline="0" dirty="0" err="1"/>
               <a:t>etc</a:t>
             </a:r>
             <a:r>
-              <a:rPr lang="en-US" baseline="0" dirty="0" smtClean="0"/>
+              <a:rPr lang="en-US" baseline="0" dirty="0"/>
               <a:t>?</a:t>
             </a:r>
           </a:p>
           <a:p>
-            <a:endParaRPr lang="en-US" baseline="0" dirty="0" smtClean="0"/>
+            <a:endParaRPr lang="en-US" baseline="0" dirty="0"/>
           </a:p>
           <a:p>
             <a:pPr marL="0" marR="0" lvl="1" indent="0" algn="l" defTabSz="914400" rtl="0" eaLnBrk="1" fontAlgn="auto" latinLnBrk="0" hangingPunct="1">
@@ -763,19 +762,19 @@
               <a:defRPr/>
             </a:pPr>
             <a:r>
-              <a:rPr lang="en-US" baseline="0" dirty="0" smtClean="0"/>
+              <a:rPr lang="en-US" baseline="0" dirty="0"/>
               <a:t>Note about HDFS: </a:t>
             </a:r>
             <a:r>
-              <a:rPr lang="en-US" dirty="0" smtClean="0"/>
+              <a:rPr lang="en-US" dirty="0"/>
               <a:t>Most HDFS commands work (except OS-specific ones like </a:t>
             </a:r>
             <a:r>
-              <a:rPr lang="en-US" dirty="0" err="1" smtClean="0"/>
+              <a:rPr lang="en-US" dirty="0" err="1"/>
               <a:t>fschk</a:t>
             </a:r>
             <a:r>
-              <a:rPr lang="en-US" dirty="0" smtClean="0"/>
+              <a:rPr lang="en-US" dirty="0"/>
               <a:t>)</a:t>
             </a:r>
           </a:p>
@@ -949,13 +948,13 @@
           <a:lstStyle/>
           <a:p>
             <a:r>
-              <a:rPr lang="en-US" dirty="0" smtClean="0">
+              <a:rPr lang="en-US" dirty="0">
                 <a:effectLst/>
               </a:rPr>
               <a:t>Notes – the notions of interactivity</a:t>
             </a:r>
             <a:r>
-              <a:rPr lang="en-US" baseline="0" dirty="0" smtClean="0">
+              <a:rPr lang="en-US" baseline="0" dirty="0">
                 <a:effectLst/>
               </a:rPr>
               <a:t> and immediacy when working with Spark are key/fundamental</a:t>
@@ -963,7 +962,7 @@
           </a:p>
           <a:p>
             <a:r>
-              <a:rPr lang="en-US" dirty="0" smtClean="0">
+              <a:rPr lang="en-US" dirty="0">
                 <a:effectLst/>
               </a:rPr>
               <a:t>https://azure.microsoft.com/en-us/documentation/videos/announcing-apache-spark-on-azure-hdinsight/</a:t>
@@ -971,79 +970,79 @@
           </a:p>
           <a:p>
             <a:r>
-              <a:rPr lang="en-US" dirty="0" smtClean="0">
+              <a:rPr lang="en-US" dirty="0">
                 <a:effectLst/>
               </a:rPr>
               <a:t>Notes – not *just* fast for in-memory, but also fast for on-disk/larger data sets</a:t>
             </a:r>
           </a:p>
           <a:p>
-            <a:endParaRPr lang="en-US" dirty="0" smtClean="0">
+            <a:endParaRPr lang="en-US" dirty="0">
               <a:effectLst/>
             </a:endParaRPr>
           </a:p>
           <a:p>
             <a:r>
-              <a:rPr lang="en-US" dirty="0" smtClean="0">
+              <a:rPr lang="en-US" dirty="0">
                 <a:effectLst/>
               </a:rPr>
               <a:t>Apache Spark is a fast, in-memory data processing engine with elegant and expressive development APIs in Scala, Java, Python, and R that allow data workers to efficiently execute machine learning algorithms that require fast iterative access to datasets. Spark on Apache Hadoop YARN enables deep integration with Hadoop and other YARN enabled workloads in the enterprise.</a:t>
             </a:r>
           </a:p>
           <a:p>
-            <a:endParaRPr lang="en-US" dirty="0" smtClean="0">
+            <a:endParaRPr lang="en-US" dirty="0">
               <a:effectLst/>
             </a:endParaRPr>
           </a:p>
           <a:p>
             <a:r>
-              <a:rPr lang="en-US" dirty="0" smtClean="0"/>
+              <a:rPr lang="en-US" dirty="0"/>
               <a:t>At the core of Spark is the notion of a Resilient Distributed Dataset (RDD), which is an immutable collection of objects that is partitioned and distributed across multiple physical nodes of a YARN cluster and that can be operated in parallel.</a:t>
             </a:r>
             <a:r>
-              <a:rPr lang="en-US" baseline="0" dirty="0" smtClean="0"/>
+              <a:rPr lang="en-US" baseline="0" dirty="0"/>
               <a:t> </a:t>
             </a:r>
             <a:r>
-              <a:rPr lang="en-US" dirty="0" smtClean="0"/>
+              <a:rPr lang="en-US" dirty="0"/>
               <a:t>Typically, RDDs are instantiated by loading data from a shared filesystem, HDFS, </a:t>
             </a:r>
             <a:r>
-              <a:rPr lang="en-US" dirty="0" err="1" smtClean="0"/>
+              <a:rPr lang="en-US" dirty="0" err="1"/>
               <a:t>HBase</a:t>
             </a:r>
             <a:r>
-              <a:rPr lang="en-US" dirty="0" smtClean="0"/>
+              <a:rPr lang="en-US" dirty="0"/>
               <a:t>, or any data source offering a Hadoop </a:t>
             </a:r>
             <a:r>
-              <a:rPr lang="en-US" dirty="0" err="1" smtClean="0"/>
+              <a:rPr lang="en-US" dirty="0" err="1"/>
               <a:t>InputFormat</a:t>
             </a:r>
             <a:r>
-              <a:rPr lang="en-US" dirty="0" smtClean="0"/>
+              <a:rPr lang="en-US" dirty="0"/>
               <a:t> on a YARN cluster.</a:t>
             </a:r>
           </a:p>
           <a:p>
-            <a:endParaRPr lang="en-US" dirty="0" smtClean="0"/>
-          </a:p>
-          <a:p>
-            <a:r>
-              <a:rPr lang="en-US" dirty="0" smtClean="0"/>
+            <a:endParaRPr lang="en-US" dirty="0"/>
+          </a:p>
+          <a:p>
+            <a:r>
+              <a:rPr lang="en-US" dirty="0"/>
               <a:t>Once an RDD is instantiated, you can apply a series of operations. All operations fall into one of two types: transformations or actions. Transformation operations, as the name suggests, create new datasets from an existing RDD and build out the processing Directed Acyclic Graph (DAG) that can then be applied on the partitioned dataset across the YARN cluster. An Action operation, on the other hand, executes DAG and returns a value.</a:t>
             </a:r>
           </a:p>
           <a:p>
-            <a:endParaRPr lang="en-US" dirty="0" smtClean="0"/>
-          </a:p>
-          <a:p>
-            <a:r>
-              <a:rPr lang="en-US" dirty="0" smtClean="0"/>
+            <a:endParaRPr lang="en-US" dirty="0"/>
+          </a:p>
+          <a:p>
+            <a:r>
+              <a:rPr lang="en-US" dirty="0"/>
               <a:t>Spark can perform up to 100 times faster than Hadoop thanks</a:t>
             </a:r>
             <a:r>
-              <a:rPr lang="en-US" baseline="0" dirty="0" smtClean="0"/>
+              <a:rPr lang="en-US" baseline="0" dirty="0"/>
               <a:t> to its in-memory parallel processing model.</a:t>
             </a:r>
             <a:endParaRPr lang="en-US" dirty="0"/>
@@ -1154,10 +1153,9 @@
           </a:lstStyle>
           <a:p>
             <a:r>
-              <a:rPr lang="en-US" dirty="0" smtClean="0"/>
+              <a:rPr lang="en-US" dirty="0"/>
               <a:t>Title Here</a:t>
             </a:r>
-            <a:endParaRPr lang="en-US" dirty="0"/>
           </a:p>
         </p:txBody>
       </p:sp>
@@ -1216,21 +1214,21 @@
           <a:p>
             <a:pPr lvl="0"/>
             <a:r>
-              <a:rPr lang="en-US" dirty="0" smtClean="0"/>
+              <a:rPr lang="en-US" dirty="0"/>
               <a:t>Name</a:t>
             </a:r>
           </a:p>
           <a:p>
             <a:pPr lvl="0"/>
             <a:r>
-              <a:rPr lang="en-US" dirty="0" smtClean="0"/>
+              <a:rPr lang="en-US" dirty="0"/>
               <a:t>Title</a:t>
             </a:r>
           </a:p>
           <a:p>
             <a:pPr lvl="0"/>
             <a:r>
-              <a:rPr lang="en-US" dirty="0" smtClean="0"/>
+              <a:rPr lang="en-US" dirty="0"/>
               <a:t>Microsoft Corporation</a:t>
             </a:r>
           </a:p>
@@ -1279,13 +1277,6 @@
   <p:transition>
     <p:fade/>
   </p:transition>
-  <p:timing>
-    <p:tnLst>
-      <p:par>
-        <p:cTn id="1" dur="indefinite" restart="never" nodeType="tmRoot"/>
-      </p:par>
-    </p:tnLst>
-  </p:timing>
 </p:sldLayout>
 </file>
 
@@ -1352,7 +1343,7 @@
           </a:lstStyle>
           <a:p>
             <a:r>
-              <a:rPr lang="en-US" smtClean="0"/>
+              <a:rPr lang="en-US"/>
               <a:t>Click to edit Master title style</a:t>
             </a:r>
             <a:endParaRPr lang="en-US" dirty="0"/>
@@ -1484,7 +1475,7 @@
           </a:lstStyle>
           <a:p>
             <a:r>
-              <a:rPr lang="en-US" smtClean="0"/>
+              <a:rPr lang="en-US"/>
               <a:t>Click to edit Master subtitle style</a:t>
             </a:r>
             <a:endParaRPr lang="en-US" dirty="0"/>
@@ -1545,7 +1536,7 @@
           <a:p>
             <a:pPr lvl="0"/>
             <a:r>
-              <a:rPr lang="en-US" dirty="0" smtClean="0"/>
+              <a:rPr lang="en-US" dirty="0"/>
               <a:t>click to…</a:t>
             </a:r>
           </a:p>
@@ -1907,13 +1898,6 @@
   <p:transition>
     <p:fade/>
   </p:transition>
-  <p:timing>
-    <p:tnLst>
-      <p:par>
-        <p:cTn id="1" dur="indefinite" restart="never" nodeType="tmRoot"/>
-      </p:par>
-    </p:tnLst>
-  </p:timing>
 </p:sldLayout>
 </file>
 
@@ -1980,7 +1964,7 @@
           </a:lstStyle>
           <a:p>
             <a:r>
-              <a:rPr lang="en-US" smtClean="0"/>
+              <a:rPr lang="en-US"/>
               <a:t>Click to edit Master title style</a:t>
             </a:r>
             <a:endParaRPr lang="en-US" dirty="0"/>
@@ -2112,7 +2096,7 @@
           </a:lstStyle>
           <a:p>
             <a:r>
-              <a:rPr lang="en-US" smtClean="0"/>
+              <a:rPr lang="en-US"/>
               <a:t>Click to edit Master subtitle style</a:t>
             </a:r>
             <a:endParaRPr lang="en-US" dirty="0"/>
@@ -2173,7 +2157,7 @@
           <a:p>
             <a:pPr lvl="0"/>
             <a:r>
-              <a:rPr lang="en-US" dirty="0" smtClean="0"/>
+              <a:rPr lang="en-US" dirty="0"/>
               <a:t>click to…</a:t>
             </a:r>
           </a:p>
@@ -2500,13 +2484,6 @@
   <p:transition>
     <p:fade/>
   </p:transition>
-  <p:timing>
-    <p:tnLst>
-      <p:par>
-        <p:cTn id="1" dur="indefinite" restart="never" nodeType="tmRoot"/>
-      </p:par>
-    </p:tnLst>
-  </p:timing>
 </p:sldLayout>
 </file>
 
@@ -2573,7 +2550,7 @@
           </a:lstStyle>
           <a:p>
             <a:r>
-              <a:rPr lang="en-US" smtClean="0"/>
+              <a:rPr lang="en-US"/>
               <a:t>Click to edit Master title style</a:t>
             </a:r>
             <a:endParaRPr lang="en-US" dirty="0"/>
@@ -2705,7 +2682,7 @@
           </a:lstStyle>
           <a:p>
             <a:r>
-              <a:rPr lang="en-US" smtClean="0"/>
+              <a:rPr lang="en-US"/>
               <a:t>Click to edit Master subtitle style</a:t>
             </a:r>
             <a:endParaRPr lang="en-US" dirty="0"/>
@@ -2766,7 +2743,7 @@
           <a:p>
             <a:pPr lvl="0"/>
             <a:r>
-              <a:rPr lang="en-US" dirty="0" smtClean="0"/>
+              <a:rPr lang="en-US" dirty="0"/>
               <a:t>click to…</a:t>
             </a:r>
           </a:p>
@@ -4108,13 +4085,6 @@
   <p:transition>
     <p:fade/>
   </p:transition>
-  <p:timing>
-    <p:tnLst>
-      <p:par>
-        <p:cTn id="1" dur="indefinite" restart="never" nodeType="tmRoot"/>
-      </p:par>
-    </p:tnLst>
-  </p:timing>
 </p:sldLayout>
 </file>
 
@@ -4181,7 +4151,7 @@
           </a:lstStyle>
           <a:p>
             <a:r>
-              <a:rPr lang="en-US" smtClean="0"/>
+              <a:rPr lang="en-US"/>
               <a:t>Click to edit Master title style</a:t>
             </a:r>
             <a:endParaRPr lang="en-US" dirty="0"/>
@@ -4313,7 +4283,7 @@
           </a:lstStyle>
           <a:p>
             <a:r>
-              <a:rPr lang="en-US" smtClean="0"/>
+              <a:rPr lang="en-US"/>
               <a:t>Click to edit Master subtitle style</a:t>
             </a:r>
             <a:endParaRPr lang="en-US" dirty="0"/>
@@ -4370,7 +4340,7 @@
           <a:p>
             <a:pPr lvl="0"/>
             <a:r>
-              <a:rPr lang="en-US" dirty="0" smtClean="0"/>
+              <a:rPr lang="en-US" dirty="0"/>
               <a:t>click to…</a:t>
             </a:r>
           </a:p>
@@ -4744,13 +4714,6 @@
   <p:transition>
     <p:fade/>
   </p:transition>
-  <p:timing>
-    <p:tnLst>
-      <p:par>
-        <p:cTn id="1" dur="indefinite" restart="never" nodeType="tmRoot"/>
-      </p:par>
-    </p:tnLst>
-  </p:timing>
 </p:sldLayout>
 </file>
 
@@ -4817,7 +4780,7 @@
           </a:lstStyle>
           <a:p>
             <a:r>
-              <a:rPr lang="en-US" smtClean="0"/>
+              <a:rPr lang="en-US"/>
               <a:t>Click to edit Master title style</a:t>
             </a:r>
             <a:endParaRPr lang="en-US" dirty="0"/>
@@ -4949,7 +4912,7 @@
           </a:lstStyle>
           <a:p>
             <a:r>
-              <a:rPr lang="en-US" smtClean="0"/>
+              <a:rPr lang="en-US"/>
               <a:t>Click to edit Master subtitle style</a:t>
             </a:r>
             <a:endParaRPr lang="en-US" dirty="0"/>
@@ -5010,7 +4973,7 @@
           <a:p>
             <a:pPr lvl="0"/>
             <a:r>
-              <a:rPr lang="en-US" dirty="0" smtClean="0"/>
+              <a:rPr lang="en-US" dirty="0"/>
               <a:t>click to…</a:t>
             </a:r>
           </a:p>
@@ -5676,13 +5639,6 @@
   <p:transition>
     <p:fade/>
   </p:transition>
-  <p:timing>
-    <p:tnLst>
-      <p:par>
-        <p:cTn id="1" dur="indefinite" restart="never" nodeType="tmRoot"/>
-      </p:par>
-    </p:tnLst>
-  </p:timing>
 </p:sldLayout>
 </file>
 
@@ -5771,7 +5727,7 @@
           <a:p>
             <a:pPr lvl="0"/>
             <a:r>
-              <a:rPr lang="en-US" smtClean="0"/>
+              <a:rPr lang="en-US"/>
               <a:t>Click to edit Master text styles</a:t>
             </a:r>
           </a:p>
@@ -5820,13 +5776,6 @@
   <p:transition>
     <p:fade/>
   </p:transition>
-  <p:timing>
-    <p:tnLst>
-      <p:par>
-        <p:cTn id="1" dur="indefinite" restart="never" nodeType="tmRoot"/>
-      </p:par>
-    </p:tnLst>
-  </p:timing>
 </p:sldLayout>
 </file>
 
@@ -7372,27 +7321,10 @@
                 </a:gradFill>
                 <a:cs typeface="Segoe UI" pitchFamily="34" charset="0"/>
               </a:rPr>
-              <a:t>© </a:t>
-            </a:r>
-            <a:r>
-              <a:rPr lang="en-US" sz="700" smtClean="0">
-                <a:gradFill>
-                  <a:gsLst>
-                    <a:gs pos="0">
-                      <a:srgbClr val="292929"/>
-                    </a:gs>
-                    <a:gs pos="100000">
-                      <a:srgbClr val="292929"/>
-                    </a:gs>
-                  </a:gsLst>
-                  <a:lin ang="5400000" scaled="0"/>
-                </a:gradFill>
-                <a:cs typeface="Segoe UI" pitchFamily="34" charset="0"/>
-              </a:rPr>
-              <a:t>201</a:t>
-            </a:r>
-            <a:r>
-              <a:rPr lang="en-US" altLang="zh-CN" sz="700" smtClean="0">
+              <a:t>© 201</a:t>
+            </a:r>
+            <a:r>
+              <a:rPr lang="en-US" altLang="zh-CN" sz="700">
                 <a:gradFill>
                   <a:gsLst>
                     <a:gs pos="0">
@@ -7409,7 +7341,7 @@
               <a:t>6</a:t>
             </a:r>
             <a:r>
-              <a:rPr lang="en-US" sz="700" smtClean="0">
+              <a:rPr lang="en-US" sz="700">
                 <a:gradFill>
                   <a:gsLst>
                     <a:gs pos="0">
@@ -7478,13 +7410,6 @@
   <p:transition>
     <p:fade/>
   </p:transition>
-  <p:timing>
-    <p:tnLst>
-      <p:par>
-        <p:cTn id="1" dur="indefinite" restart="never" nodeType="tmRoot"/>
-      </p:par>
-    </p:tnLst>
-  </p:timing>
 </p:sldLayout>
 </file>
 
@@ -7545,7 +7470,7 @@
           </a:lstStyle>
           <a:p>
             <a:r>
-              <a:rPr lang="en-US" smtClean="0"/>
+              <a:rPr lang="en-US"/>
               <a:t>Click to edit Master title style</a:t>
             </a:r>
             <a:endParaRPr lang="en-US" dirty="0"/>
@@ -7690,35 +7615,35 @@
           <a:p>
             <a:pPr lvl="0"/>
             <a:r>
-              <a:rPr lang="en-US" smtClean="0"/>
+              <a:rPr lang="en-US"/>
               <a:t>Click to edit Master text styles</a:t>
             </a:r>
           </a:p>
           <a:p>
             <a:pPr lvl="1"/>
             <a:r>
-              <a:rPr lang="en-US" smtClean="0"/>
+              <a:rPr lang="en-US"/>
               <a:t>Second level</a:t>
             </a:r>
           </a:p>
           <a:p>
             <a:pPr lvl="2"/>
             <a:r>
-              <a:rPr lang="en-US" smtClean="0"/>
+              <a:rPr lang="en-US"/>
               <a:t>Third level</a:t>
             </a:r>
           </a:p>
           <a:p>
             <a:pPr lvl="3"/>
             <a:r>
-              <a:rPr lang="en-US" smtClean="0"/>
+              <a:rPr lang="en-US"/>
               <a:t>Fourth level</a:t>
             </a:r>
           </a:p>
           <a:p>
             <a:pPr lvl="4"/>
             <a:r>
-              <a:rPr lang="en-US" smtClean="0"/>
+              <a:rPr lang="en-US"/>
               <a:t>Fifth level</a:t>
             </a:r>
             <a:endParaRPr lang="en-US" dirty="0"/>
@@ -7738,13 +7663,6 @@
   <p:transition>
     <p:fade/>
   </p:transition>
-  <p:timing>
-    <p:tnLst>
-      <p:par>
-        <p:cTn id="1" dur="indefinite" restart="never" nodeType="tmRoot"/>
-      </p:par>
-    </p:tnLst>
-  </p:timing>
 </p:sldLayout>
 </file>
 
@@ -7805,7 +7723,7 @@
           </a:lstStyle>
           <a:p>
             <a:r>
-              <a:rPr lang="en-US" smtClean="0"/>
+              <a:rPr lang="en-US"/>
               <a:t>Click to edit Master title style</a:t>
             </a:r>
             <a:endParaRPr lang="en-US" dirty="0"/>
@@ -7950,35 +7868,35 @@
           <a:p>
             <a:pPr lvl="0"/>
             <a:r>
-              <a:rPr lang="en-US" smtClean="0"/>
+              <a:rPr lang="en-US"/>
               <a:t>Click to edit Master text styles</a:t>
             </a:r>
           </a:p>
           <a:p>
             <a:pPr lvl="1"/>
             <a:r>
-              <a:rPr lang="en-US" smtClean="0"/>
+              <a:rPr lang="en-US"/>
               <a:t>Second level</a:t>
             </a:r>
           </a:p>
           <a:p>
             <a:pPr lvl="2"/>
             <a:r>
-              <a:rPr lang="en-US" smtClean="0"/>
+              <a:rPr lang="en-US"/>
               <a:t>Third level</a:t>
             </a:r>
           </a:p>
           <a:p>
             <a:pPr lvl="3"/>
             <a:r>
-              <a:rPr lang="en-US" smtClean="0"/>
+              <a:rPr lang="en-US"/>
               <a:t>Fourth level</a:t>
             </a:r>
           </a:p>
           <a:p>
             <a:pPr lvl="4"/>
             <a:r>
-              <a:rPr lang="en-US" smtClean="0"/>
+              <a:rPr lang="en-US"/>
               <a:t>Fifth level</a:t>
             </a:r>
             <a:endParaRPr lang="en-US" dirty="0"/>
@@ -8032,7 +7950,7 @@
           <a:p>
             <a:pPr lvl="0"/>
             <a:r>
-              <a:rPr lang="en-US" smtClean="0"/>
+              <a:rPr lang="en-US"/>
               <a:t>Click to edit Master text styles</a:t>
             </a:r>
           </a:p>
@@ -8051,13 +7969,6 @@
   <p:transition>
     <p:fade/>
   </p:transition>
-  <p:timing>
-    <p:tnLst>
-      <p:par>
-        <p:cTn id="1" dur="indefinite" restart="never" nodeType="tmRoot"/>
-      </p:par>
-    </p:tnLst>
-  </p:timing>
 </p:sldLayout>
 </file>
 
@@ -8117,7 +8028,7 @@
           </a:lstStyle>
           <a:p>
             <a:r>
-              <a:rPr lang="en-US" smtClean="0"/>
+              <a:rPr lang="en-US"/>
               <a:t>Click to edit Master title style</a:t>
             </a:r>
             <a:endParaRPr lang="en-US" dirty="0"/>
@@ -8225,35 +8136,35 @@
           <a:p>
             <a:pPr lvl="0"/>
             <a:r>
-              <a:rPr lang="en-US" smtClean="0"/>
+              <a:rPr lang="en-US"/>
               <a:t>Click to edit Master text styles</a:t>
             </a:r>
           </a:p>
           <a:p>
             <a:pPr lvl="1"/>
             <a:r>
-              <a:rPr lang="en-US" smtClean="0"/>
+              <a:rPr lang="en-US"/>
               <a:t>Second level</a:t>
             </a:r>
           </a:p>
           <a:p>
             <a:pPr lvl="2"/>
             <a:r>
-              <a:rPr lang="en-US" smtClean="0"/>
+              <a:rPr lang="en-US"/>
               <a:t>Third level</a:t>
             </a:r>
           </a:p>
           <a:p>
             <a:pPr lvl="3"/>
             <a:r>
-              <a:rPr lang="en-US" smtClean="0"/>
+              <a:rPr lang="en-US"/>
               <a:t>Fourth level</a:t>
             </a:r>
           </a:p>
           <a:p>
             <a:pPr lvl="4"/>
             <a:r>
-              <a:rPr lang="en-US" smtClean="0"/>
+              <a:rPr lang="en-US"/>
               <a:t>Fifth level</a:t>
             </a:r>
             <a:endParaRPr lang="en-US" dirty="0"/>
@@ -8273,13 +8184,6 @@
   <p:transition>
     <p:fade/>
   </p:transition>
-  <p:timing>
-    <p:tnLst>
-      <p:par>
-        <p:cTn id="1" dur="indefinite" restart="never" nodeType="tmRoot"/>
-      </p:par>
-    </p:tnLst>
-  </p:timing>
 </p:sldLayout>
 </file>
 
@@ -8316,7 +8220,7 @@
           <a:lstStyle/>
           <a:p>
             <a:r>
-              <a:rPr lang="en-US" smtClean="0"/>
+              <a:rPr lang="en-US"/>
               <a:t>Click to edit Master title style</a:t>
             </a:r>
             <a:endParaRPr lang="en-US" dirty="0"/>
@@ -8350,35 +8254,35 @@
           <a:p>
             <a:pPr lvl="0"/>
             <a:r>
-              <a:rPr lang="en-US" smtClean="0"/>
+              <a:rPr lang="en-US"/>
               <a:t>Click to edit Master text styles</a:t>
             </a:r>
           </a:p>
           <a:p>
             <a:pPr lvl="1"/>
             <a:r>
-              <a:rPr lang="en-US" smtClean="0"/>
+              <a:rPr lang="en-US"/>
               <a:t>Second level</a:t>
             </a:r>
           </a:p>
           <a:p>
             <a:pPr lvl="2"/>
             <a:r>
-              <a:rPr lang="en-US" smtClean="0"/>
+              <a:rPr lang="en-US"/>
               <a:t>Third level</a:t>
             </a:r>
           </a:p>
           <a:p>
             <a:pPr lvl="3"/>
             <a:r>
-              <a:rPr lang="en-US" smtClean="0"/>
+              <a:rPr lang="en-US"/>
               <a:t>Fourth level</a:t>
             </a:r>
           </a:p>
           <a:p>
             <a:pPr lvl="4"/>
             <a:r>
-              <a:rPr lang="en-US" smtClean="0"/>
+              <a:rPr lang="en-US"/>
               <a:t>Fifth level</a:t>
             </a:r>
             <a:endParaRPr lang="en-US" dirty="0"/>
@@ -8488,10 +8392,9 @@
           </a:lstStyle>
           <a:p>
             <a:r>
-              <a:rPr lang="en-US" dirty="0" smtClean="0"/>
+              <a:rPr lang="en-US" dirty="0"/>
               <a:t>Click to edit title style</a:t>
             </a:r>
-            <a:endParaRPr lang="en-US" dirty="0"/>
           </a:p>
         </p:txBody>
       </p:sp>
@@ -8540,10 +8443,9 @@
           <a:p>
             <a:pPr lvl="0"/>
             <a:r>
-              <a:rPr lang="en-US" dirty="0" smtClean="0"/>
+              <a:rPr lang="en-US" dirty="0"/>
               <a:t>Speaker Title</a:t>
             </a:r>
-            <a:endParaRPr lang="en-US" dirty="0"/>
           </a:p>
         </p:txBody>
       </p:sp>
@@ -8569,13 +8471,6 @@
       </p:transition>
     </mc:Fallback>
   </mc:AlternateContent>
-  <p:timing>
-    <p:tnLst>
-      <p:par>
-        <p:cTn id="1" dur="indefinite" restart="never" nodeType="tmRoot"/>
-      </p:par>
-    </p:tnLst>
-  </p:timing>
 </p:sldLayout>
 </file>
 
@@ -8612,10 +8507,9 @@
           <a:lstStyle/>
           <a:p>
             <a:r>
-              <a:rPr lang="en-US" smtClean="0"/>
+              <a:rPr lang="en-US"/>
               <a:t>Click to edit Master title style</a:t>
             </a:r>
-            <a:endParaRPr lang="en-US"/>
           </a:p>
         </p:txBody>
       </p:sp>
@@ -8672,22 +8566,13 @@
           <a:lstStyle/>
           <a:p>
             <a:r>
-              <a:rPr lang="en-US" sz="4000" dirty="0" smtClean="0">
-                <a:solidFill>
-                  <a:schemeClr val="bg1"/>
-                </a:solidFill>
-                <a:latin typeface="Segoe UI Light" panose="020B0502040204020203" pitchFamily="34" charset="0"/>
-              </a:rPr>
-              <a:t>Microsoft Azure </a:t>
-            </a:r>
-            <a:r>
               <a:rPr lang="en-US" sz="4000" dirty="0">
                 <a:solidFill>
                   <a:schemeClr val="bg1"/>
                 </a:solidFill>
                 <a:latin typeface="Segoe UI Light" panose="020B0502040204020203" pitchFamily="34" charset="0"/>
               </a:rPr>
-              <a:t>for Research </a:t>
+              <a:t>Microsoft Azure for Research </a:t>
             </a:r>
           </a:p>
           <a:p>
@@ -8744,7 +8629,7 @@
           <a:lstStyle/>
           <a:p>
             <a:r>
-              <a:rPr lang="en-US" altLang="zh-CN" sz="2000" kern="1800" baseline="30000" dirty="0" smtClean="0">
+              <a:rPr lang="en-US" altLang="zh-CN" sz="2000" kern="1800" baseline="30000" dirty="0">
                 <a:solidFill>
                   <a:schemeClr val="bg1"/>
                 </a:solidFill>
@@ -8755,17 +8640,6 @@
               <a:t>Microsoft A</a:t>
             </a:r>
             <a:r>
-              <a:rPr lang="en-US" sz="2000" kern="1800" baseline="30000" dirty="0" smtClean="0">
-                <a:solidFill>
-                  <a:schemeClr val="bg1"/>
-                </a:solidFill>
-                <a:latin typeface="Segoe UI" panose="020B0502040204020203" pitchFamily="34" charset="0"/>
-                <a:ea typeface="Segoe UI" panose="020B0502040204020203" pitchFamily="34" charset="0"/>
-                <a:cs typeface="Segoe UI" panose="020B0502040204020203" pitchFamily="34" charset="0"/>
-              </a:rPr>
-              <a:t>zure </a:t>
-            </a:r>
-            <a:r>
               <a:rPr lang="en-US" sz="2000" kern="1800" baseline="30000" dirty="0">
                 <a:solidFill>
                   <a:schemeClr val="bg1"/>
@@ -8774,7 +8648,7 @@
                 <a:ea typeface="Segoe UI" panose="020B0502040204020203" pitchFamily="34" charset="0"/>
                 <a:cs typeface="Segoe UI" panose="020B0502040204020203" pitchFamily="34" charset="0"/>
               </a:rPr>
-              <a:t>provides researchers with the power and scalability of cloud computing for collaboration, computation, and data-intensive processing. This open and flexible global cloud platform supports any language, tool, or framework. </a:t>
+              <a:t>zure provides researchers with the power and scalability of cloud computing for collaboration, computation, and data-intensive processing. This open and flexible global cloud platform supports any language, tool, or framework. </a:t>
             </a:r>
             <a:r>
               <a:rPr lang="en-US" kern="1800" baseline="30000" dirty="0">
@@ -8829,25 +8703,7 @@
                 </a:solidFill>
                 <a:latin typeface="Segoe UI Semibold" panose="020B0702040204020203" pitchFamily="34" charset="0"/>
               </a:rPr>
-              <a:t>The </a:t>
-            </a:r>
-            <a:r>
-              <a:rPr lang="en-US" sz="3200" baseline="30000" dirty="0" smtClean="0">
-                <a:solidFill>
-                  <a:srgbClr val="C60651"/>
-                </a:solidFill>
-                <a:latin typeface="Segoe UI Semibold" panose="020B0702040204020203" pitchFamily="34" charset="0"/>
-              </a:rPr>
-              <a:t>Microsoft Azure </a:t>
-            </a:r>
-            <a:r>
-              <a:rPr lang="en-US" sz="3200" baseline="30000" dirty="0">
-                <a:solidFill>
-                  <a:srgbClr val="C60651"/>
-                </a:solidFill>
-                <a:latin typeface="Segoe UI Semibold" panose="020B0702040204020203" pitchFamily="34" charset="0"/>
-              </a:rPr>
-              <a:t>for Research program:</a:t>
+              <a:t>The Microsoft Azure for Research program:</a:t>
             </a:r>
             <a:endParaRPr lang="en-US" sz="3200" baseline="30000" dirty="0">
               <a:solidFill>
@@ -8903,23 +8759,7 @@
                   <a:srgbClr val="717073"/>
                 </a:solidFill>
               </a:rPr>
-              <a:t>Free access to </a:t>
-            </a:r>
-            <a:r>
-              <a:rPr lang="en-US" sz="2000" baseline="30000" dirty="0" smtClean="0">
-                <a:solidFill>
-                  <a:srgbClr val="717073"/>
-                </a:solidFill>
-              </a:rPr>
-              <a:t>Microsoft </a:t>
-            </a:r>
-            <a:r>
-              <a:rPr lang="en-US" sz="2000" baseline="30000" dirty="0">
-                <a:solidFill>
-                  <a:srgbClr val="717073"/>
-                </a:solidFill>
-              </a:rPr>
-              <a:t>Azure cloud computing and storage  </a:t>
+              <a:t>Free access to Microsoft Azure cloud computing and storage  </a:t>
             </a:r>
             <a:r>
               <a:rPr lang="en-US" sz="2000" dirty="0">
@@ -8945,7 +8785,7 @@
               <a:t>   (submit proposals for </a:t>
             </a:r>
             <a:r>
-              <a:rPr lang="en-US" altLang="zh-CN" sz="2000" baseline="30000" dirty="0" smtClean="0">
+              <a:rPr lang="en-US" altLang="zh-CN" sz="2000" baseline="30000" dirty="0">
                 <a:solidFill>
                   <a:srgbClr val="717073"/>
                 </a:solidFill>
@@ -8953,20 +8793,12 @@
               <a:t>Microsoft </a:t>
             </a:r>
             <a:r>
-              <a:rPr lang="en-US" sz="2000" baseline="30000" dirty="0" smtClean="0">
-                <a:solidFill>
-                  <a:srgbClr val="717073"/>
-                </a:solidFill>
-              </a:rPr>
-              <a:t>Azure </a:t>
-            </a:r>
-            <a:r>
               <a:rPr lang="en-US" sz="2000" baseline="30000" dirty="0">
                 <a:solidFill>
                   <a:srgbClr val="717073"/>
                 </a:solidFill>
               </a:rPr>
-              <a:t>Research Awards)</a:t>
+              <a:t>Azure Research Awards)</a:t>
             </a:r>
           </a:p>
           <a:p>
@@ -8987,7 +8819,7 @@
               <a:t>  </a:t>
             </a:r>
             <a:r>
-              <a:rPr lang="en-US" altLang="zh-CN" sz="2000" baseline="30000" dirty="0" smtClean="0">
+              <a:rPr lang="en-US" altLang="zh-CN" sz="2000" baseline="30000" dirty="0">
                 <a:solidFill>
                   <a:srgbClr val="717073"/>
                 </a:solidFill>
@@ -8995,20 +8827,12 @@
               <a:t>Microsoft </a:t>
             </a:r>
             <a:r>
-              <a:rPr lang="en-US" sz="2000" baseline="30000" dirty="0" smtClean="0">
-                <a:solidFill>
-                  <a:srgbClr val="717073"/>
-                </a:solidFill>
-              </a:rPr>
-              <a:t>Azure </a:t>
-            </a:r>
-            <a:r>
               <a:rPr lang="en-US" sz="2000" baseline="30000" dirty="0">
                 <a:solidFill>
                   <a:srgbClr val="717073"/>
                 </a:solidFill>
               </a:rPr>
-              <a:t>for Research training classes </a:t>
+              <a:t>Azure for Research training classes </a:t>
             </a:r>
           </a:p>
           <a:p>
@@ -9226,7 +9050,7 @@
           </a:lstStyle>
           <a:p>
             <a:r>
-              <a:rPr lang="en-US" smtClean="0"/>
+              <a:rPr lang="en-US"/>
               <a:t>Click to edit Master title style</a:t>
             </a:r>
             <a:endParaRPr lang="en-US" dirty="0"/>
@@ -9396,7 +9220,7 @@
               <a:buChar char="•"/>
             </a:pPr>
             <a:r>
-              <a:rPr lang="en-US" smtClean="0"/>
+              <a:rPr lang="en-US"/>
               <a:t>Click to edit Master text styles</a:t>
             </a:r>
           </a:p>
@@ -9413,7 +9237,7 @@
               <a:buChar char="•"/>
             </a:pPr>
             <a:r>
-              <a:rPr lang="en-US" smtClean="0"/>
+              <a:rPr lang="en-US"/>
               <a:t>Second level</a:t>
             </a:r>
           </a:p>
@@ -9430,7 +9254,7 @@
               <a:buChar char="•"/>
             </a:pPr>
             <a:r>
-              <a:rPr lang="en-US" smtClean="0"/>
+              <a:rPr lang="en-US"/>
               <a:t>Third level</a:t>
             </a:r>
           </a:p>
@@ -9447,7 +9271,7 @@
               <a:buChar char="•"/>
             </a:pPr>
             <a:r>
-              <a:rPr lang="en-US" smtClean="0"/>
+              <a:rPr lang="en-US"/>
               <a:t>Fourth level</a:t>
             </a:r>
           </a:p>
@@ -9464,10 +9288,10 @@
               <a:buChar char="•"/>
             </a:pPr>
             <a:r>
-              <a:rPr lang="en-US" smtClean="0"/>
+              <a:rPr lang="en-US"/>
               <a:t>Fifth level</a:t>
             </a:r>
-            <a:endParaRPr lang="en-US" dirty="0" smtClean="0"/>
+            <a:endParaRPr lang="en-US" dirty="0"/>
           </a:p>
         </p:txBody>
       </p:sp>
@@ -9566,7 +9390,7 @@
           </a:lstStyle>
           <a:p>
             <a:r>
-              <a:rPr lang="en-US" smtClean="0"/>
+              <a:rPr lang="en-US"/>
               <a:t>Click to edit Master title style</a:t>
             </a:r>
             <a:endParaRPr lang="en-US" dirty="0"/>
@@ -9653,35 +9477,35 @@
           <a:p>
             <a:pPr lvl="0"/>
             <a:r>
-              <a:rPr lang="en-US" smtClean="0"/>
+              <a:rPr lang="en-US"/>
               <a:t>Click to edit Master text styles</a:t>
             </a:r>
           </a:p>
           <a:p>
             <a:pPr lvl="1"/>
             <a:r>
-              <a:rPr lang="en-US" smtClean="0"/>
+              <a:rPr lang="en-US"/>
               <a:t>Second level</a:t>
             </a:r>
           </a:p>
           <a:p>
             <a:pPr lvl="2"/>
             <a:r>
-              <a:rPr lang="en-US" smtClean="0"/>
+              <a:rPr lang="en-US"/>
               <a:t>Third level</a:t>
             </a:r>
           </a:p>
           <a:p>
             <a:pPr lvl="3"/>
             <a:r>
-              <a:rPr lang="en-US" smtClean="0"/>
+              <a:rPr lang="en-US"/>
               <a:t>Fourth level</a:t>
             </a:r>
           </a:p>
           <a:p>
             <a:pPr lvl="4"/>
             <a:r>
-              <a:rPr lang="en-US" smtClean="0"/>
+              <a:rPr lang="en-US"/>
               <a:t>Fifth level</a:t>
             </a:r>
             <a:endParaRPr lang="en-US" dirty="0"/>
@@ -9853,7 +9677,7 @@
               <a:buChar char="•"/>
             </a:pPr>
             <a:r>
-              <a:rPr lang="en-US" smtClean="0"/>
+              <a:rPr lang="en-US"/>
               <a:t>Click to edit Master text styles</a:t>
             </a:r>
           </a:p>
@@ -9870,7 +9694,7 @@
               <a:buChar char="•"/>
             </a:pPr>
             <a:r>
-              <a:rPr lang="en-US" smtClean="0"/>
+              <a:rPr lang="en-US"/>
               <a:t>Second level</a:t>
             </a:r>
           </a:p>
@@ -9887,7 +9711,7 @@
               <a:buChar char="•"/>
             </a:pPr>
             <a:r>
-              <a:rPr lang="en-US" smtClean="0"/>
+              <a:rPr lang="en-US"/>
               <a:t>Third level</a:t>
             </a:r>
           </a:p>
@@ -9904,7 +9728,7 @@
               <a:buChar char="•"/>
             </a:pPr>
             <a:r>
-              <a:rPr lang="en-US" smtClean="0"/>
+              <a:rPr lang="en-US"/>
               <a:t>Fourth level</a:t>
             </a:r>
           </a:p>
@@ -9921,7 +9745,7 @@
               <a:buChar char="•"/>
             </a:pPr>
             <a:r>
-              <a:rPr lang="en-US" smtClean="0"/>
+              <a:rPr lang="en-US"/>
               <a:t>Fifth level</a:t>
             </a:r>
             <a:endParaRPr lang="en-US" dirty="0"/>
@@ -9978,13 +9802,6 @@
   <p:transition>
     <p:fade/>
   </p:transition>
-  <p:timing>
-    <p:tnLst>
-      <p:par>
-        <p:cTn id="1" dur="indefinite" restart="never" nodeType="tmRoot"/>
-      </p:par>
-    </p:tnLst>
-  </p:timing>
 </p:sldLayout>
 </file>
 
@@ -10030,7 +9847,7 @@
           </a:lstStyle>
           <a:p>
             <a:r>
-              <a:rPr lang="en-US" smtClean="0"/>
+              <a:rPr lang="en-US"/>
               <a:t>Click to edit Master title style</a:t>
             </a:r>
             <a:endParaRPr lang="en-US" dirty="0"/>
@@ -10104,7 +9921,7 @@
           <a:p>
             <a:pPr lvl="0"/>
             <a:r>
-              <a:rPr lang="en-US" smtClean="0"/>
+              <a:rPr lang="en-US"/>
               <a:t>Click to edit Master text styles</a:t>
             </a:r>
           </a:p>
@@ -10175,35 +9992,35 @@
           <a:p>
             <a:pPr lvl="0"/>
             <a:r>
-              <a:rPr lang="en-US" smtClean="0"/>
+              <a:rPr lang="en-US"/>
               <a:t>Click to edit Master text styles</a:t>
             </a:r>
           </a:p>
           <a:p>
             <a:pPr lvl="1"/>
             <a:r>
-              <a:rPr lang="en-US" smtClean="0"/>
+              <a:rPr lang="en-US"/>
               <a:t>Second level</a:t>
             </a:r>
           </a:p>
           <a:p>
             <a:pPr lvl="2"/>
             <a:r>
-              <a:rPr lang="en-US" smtClean="0"/>
+              <a:rPr lang="en-US"/>
               <a:t>Third level</a:t>
             </a:r>
           </a:p>
           <a:p>
             <a:pPr lvl="3"/>
             <a:r>
-              <a:rPr lang="en-US" smtClean="0"/>
+              <a:rPr lang="en-US"/>
               <a:t>Fourth level</a:t>
             </a:r>
           </a:p>
           <a:p>
             <a:pPr lvl="4"/>
             <a:r>
-              <a:rPr lang="en-US" smtClean="0"/>
+              <a:rPr lang="en-US"/>
               <a:t>Fifth level</a:t>
             </a:r>
             <a:endParaRPr lang="en-US" dirty="0"/>
@@ -10277,7 +10094,7 @@
           <a:p>
             <a:pPr lvl="0"/>
             <a:r>
-              <a:rPr lang="en-US" smtClean="0"/>
+              <a:rPr lang="en-US"/>
               <a:t>Click to edit Master text styles</a:t>
             </a:r>
           </a:p>
@@ -10431,7 +10248,7 @@
               <a:buSzPct val="80000"/>
             </a:pPr>
             <a:r>
-              <a:rPr lang="en-US" smtClean="0"/>
+              <a:rPr lang="en-US"/>
               <a:t>Click to edit Master text styles</a:t>
             </a:r>
           </a:p>
@@ -10446,7 +10263,7 @@
               <a:buSzPct val="80000"/>
             </a:pPr>
             <a:r>
-              <a:rPr lang="en-US" smtClean="0"/>
+              <a:rPr lang="en-US"/>
               <a:t>Second level</a:t>
             </a:r>
           </a:p>
@@ -10461,7 +10278,7 @@
               <a:buSzPct val="80000"/>
             </a:pPr>
             <a:r>
-              <a:rPr lang="en-US" smtClean="0"/>
+              <a:rPr lang="en-US"/>
               <a:t>Third level</a:t>
             </a:r>
           </a:p>
@@ -10476,7 +10293,7 @@
               <a:buSzPct val="80000"/>
             </a:pPr>
             <a:r>
-              <a:rPr lang="en-US" smtClean="0"/>
+              <a:rPr lang="en-US"/>
               <a:t>Fourth level</a:t>
             </a:r>
           </a:p>
@@ -10491,7 +10308,7 @@
               <a:buSzPct val="80000"/>
             </a:pPr>
             <a:r>
-              <a:rPr lang="en-US" smtClean="0"/>
+              <a:rPr lang="en-US"/>
               <a:t>Fifth level</a:t>
             </a:r>
             <a:endParaRPr lang="en-US" dirty="0"/>
@@ -10548,13 +10365,6 @@
   <p:transition>
     <p:fade/>
   </p:transition>
-  <p:timing>
-    <p:tnLst>
-      <p:par>
-        <p:cTn id="1" dur="indefinite" restart="never" nodeType="tmRoot"/>
-      </p:par>
-    </p:tnLst>
-  </p:timing>
 </p:sldLayout>
 </file>
 
@@ -10600,7 +10410,7 @@
           </a:lstStyle>
           <a:p>
             <a:r>
-              <a:rPr lang="en-US" smtClean="0"/>
+              <a:rPr lang="en-US"/>
               <a:t>Click to edit Master title style</a:t>
             </a:r>
             <a:endParaRPr lang="en-US" dirty="0"/>
@@ -10657,13 +10467,6 @@
   <p:transition>
     <p:fade/>
   </p:transition>
-  <p:timing>
-    <p:tnLst>
-      <p:par>
-        <p:cTn id="1" dur="indefinite" restart="never" nodeType="tmRoot"/>
-      </p:par>
-    </p:tnLst>
-  </p:timing>
 </p:sldLayout>
 </file>
 
@@ -10734,13 +10537,6 @@
   <p:transition>
     <p:fade/>
   </p:transition>
-  <p:timing>
-    <p:tnLst>
-      <p:par>
-        <p:cTn id="1" dur="indefinite" restart="never" nodeType="tmRoot"/>
-      </p:par>
-    </p:tnLst>
-  </p:timing>
 </p:sldLayout>
 </file>
 
@@ -10774,13 +10570,6 @@
   <p:transition>
     <p:fade/>
   </p:transition>
-  <p:timing>
-    <p:tnLst>
-      <p:par>
-        <p:cTn id="1" dur="indefinite" restart="never" nodeType="tmRoot"/>
-      </p:par>
-    </p:tnLst>
-  </p:timing>
 </p:sldLayout>
 </file>
 
@@ -10928,7 +10717,7 @@
           </a:lstStyle>
           <a:p>
             <a:r>
-              <a:rPr lang="en-US" smtClean="0"/>
+              <a:rPr lang="en-US"/>
               <a:t>Click to edit Master title style</a:t>
             </a:r>
             <a:endParaRPr lang="en-US" dirty="0"/>
@@ -11009,7 +10798,7 @@
               <a:buSzPct val="80000"/>
             </a:pPr>
             <a:r>
-              <a:rPr lang="en-US" smtClean="0"/>
+              <a:rPr lang="en-US"/>
               <a:t>Click to edit Master text styles</a:t>
             </a:r>
           </a:p>
@@ -11027,7 +10816,7 @@
               <a:buSzPct val="80000"/>
             </a:pPr>
             <a:r>
-              <a:rPr lang="en-US" smtClean="0"/>
+              <a:rPr lang="en-US"/>
               <a:t>Second level</a:t>
             </a:r>
           </a:p>
@@ -11429,7 +11218,7 @@
           <a:lstStyle/>
           <a:p>
             <a:r>
-              <a:rPr lang="en-US" smtClean="0"/>
+              <a:rPr lang="en-US"/>
               <a:t>Click to edit Master title style</a:t>
             </a:r>
             <a:endParaRPr lang="en-US" dirty="0"/>
@@ -11463,35 +11252,35 @@
           <a:p>
             <a:pPr lvl="0"/>
             <a:r>
-              <a:rPr lang="en-US" smtClean="0"/>
+              <a:rPr lang="en-US"/>
               <a:t>Click to edit Master text styles</a:t>
             </a:r>
           </a:p>
           <a:p>
             <a:pPr lvl="1"/>
             <a:r>
-              <a:rPr lang="en-US" smtClean="0"/>
+              <a:rPr lang="en-US"/>
               <a:t>Second level</a:t>
             </a:r>
           </a:p>
           <a:p>
             <a:pPr lvl="2"/>
             <a:r>
-              <a:rPr lang="en-US" smtClean="0"/>
+              <a:rPr lang="en-US"/>
               <a:t>Third level</a:t>
             </a:r>
           </a:p>
           <a:p>
             <a:pPr lvl="3"/>
             <a:r>
-              <a:rPr lang="en-US" smtClean="0"/>
+              <a:rPr lang="en-US"/>
               <a:t>Fourth level</a:t>
             </a:r>
           </a:p>
           <a:p>
             <a:pPr lvl="4"/>
             <a:r>
-              <a:rPr lang="en-US" smtClean="0"/>
+              <a:rPr lang="en-US"/>
               <a:t>Fifth level</a:t>
             </a:r>
             <a:endParaRPr lang="en-US" dirty="0"/>
@@ -11532,13 +11321,6 @@
   <p:transition>
     <p:fade/>
   </p:transition>
-  <p:timing>
-    <p:tnLst>
-      <p:par>
-        <p:cTn id="1" dur="indefinite" restart="never" nodeType="tmRoot"/>
-      </p:par>
-    </p:tnLst>
-  </p:timing>
   <p:txStyles>
     <p:titleStyle>
       <a:lvl1pPr algn="l" defTabSz="914089" rtl="0" eaLnBrk="1" latinLnBrk="0" hangingPunct="1">
@@ -11906,10 +11688,9 @@
           <a:lstStyle/>
           <a:p>
             <a:r>
-              <a:rPr lang="en-US" dirty="0" smtClean="0"/>
+              <a:rPr lang="en-US" dirty="0"/>
               <a:t>Big-Data Analytics with Azure HDInsight </a:t>
             </a:r>
-            <a:endParaRPr lang="en-US" dirty="0"/>
           </a:p>
         </p:txBody>
       </p:sp>
@@ -11934,7 +11715,7 @@
           <a:lstStyle/>
           <a:p>
             <a:r>
-              <a:rPr lang="en-US" dirty="0" smtClean="0"/>
+              <a:rPr lang="en-US" dirty="0"/>
               <a:t>Microsoft Research</a:t>
             </a:r>
           </a:p>
@@ -11953,13 +11734,6 @@
   <p:transition>
     <p:fade/>
   </p:transition>
-  <p:timing>
-    <p:tnLst>
-      <p:par>
-        <p:cTn id="1" dur="indefinite" restart="never" nodeType="tmRoot"/>
-      </p:par>
-    </p:tnLst>
-  </p:timing>
 </p:sld>
 </file>
 
@@ -11996,10 +11770,9 @@
           <a:lstStyle/>
           <a:p>
             <a:r>
-              <a:rPr lang="en-US" dirty="0" smtClean="0"/>
+              <a:rPr lang="en-US" dirty="0"/>
               <a:t>Hands-On Lab</a:t>
             </a:r>
-            <a:endParaRPr lang="en-US" dirty="0"/>
           </a:p>
         </p:txBody>
       </p:sp>
@@ -12024,10 +11797,9 @@
           <a:lstStyle/>
           <a:p>
             <a:r>
-              <a:rPr lang="en-US" dirty="0" smtClean="0"/>
+              <a:rPr lang="en-US" dirty="0"/>
               <a:t>HDInsight Spark HOL.html</a:t>
             </a:r>
-            <a:endParaRPr lang="en-US" dirty="0"/>
           </a:p>
         </p:txBody>
       </p:sp>
@@ -12052,10 +11824,9 @@
           <a:lstStyle/>
           <a:p>
             <a:r>
-              <a:rPr lang="en-US" dirty="0" smtClean="0"/>
+              <a:rPr lang="en-US" dirty="0"/>
               <a:t>Apache Spark for Azure HDInsight</a:t>
             </a:r>
-            <a:endParaRPr lang="en-US" dirty="0"/>
           </a:p>
         </p:txBody>
       </p:sp>
@@ -12072,13 +11843,6 @@
   <p:transition>
     <p:fade/>
   </p:transition>
-  <p:timing>
-    <p:tnLst>
-      <p:par>
-        <p:cTn id="1" dur="indefinite" restart="never" nodeType="tmRoot"/>
-      </p:par>
-    </p:tnLst>
-  </p:timing>
 </p:sld>
 </file>
 
@@ -12112,13 +11876,6 @@
   <p:transition>
     <p:fade/>
   </p:transition>
-  <p:timing>
-    <p:tnLst>
-      <p:par>
-        <p:cTn id="1" dur="indefinite" restart="never" nodeType="tmRoot"/>
-      </p:par>
-    </p:tnLst>
-  </p:timing>
 </p:sld>
 </file>
 
@@ -12321,53 +12078,8 @@
                     <a:ea typeface="Segoe UI" pitchFamily="34" charset="0"/>
                     <a:cs typeface="Segoe UI" pitchFamily="34" charset="0"/>
                   </a:rPr>
-                  <a:t>$100 gets you </a:t>
+                  <a:t>$100 gets you 3 million times more storage in 30 years</a:t>
                 </a:r>
-                <a:r>
-                  <a:rPr lang="en-US" sz="1400" spc="-95" dirty="0" smtClean="0">
-                    <a:solidFill>
-                      <a:srgbClr val="FFFFFF">
-                        <a:alpha val="99000"/>
-                      </a:srgbClr>
-                    </a:solidFill>
-                    <a:ea typeface="Segoe UI" pitchFamily="34" charset="0"/>
-                    <a:cs typeface="Segoe UI" pitchFamily="34" charset="0"/>
-                  </a:rPr>
-                  <a:t>3 million </a:t>
-                </a:r>
-                <a:r>
-                  <a:rPr lang="en-US" sz="1400" spc="-95" dirty="0">
-                    <a:solidFill>
-                      <a:srgbClr val="FFFFFF">
-                        <a:alpha val="99000"/>
-                      </a:srgbClr>
-                    </a:solidFill>
-                    <a:ea typeface="Segoe UI" pitchFamily="34" charset="0"/>
-                    <a:cs typeface="Segoe UI" pitchFamily="34" charset="0"/>
-                  </a:rPr>
-                  <a:t>times more storage in 30 </a:t>
-                </a:r>
-                <a:r>
-                  <a:rPr lang="en-US" sz="1400" spc="-95" dirty="0" smtClean="0">
-                    <a:solidFill>
-                      <a:srgbClr val="FFFFFF">
-                        <a:alpha val="99000"/>
-                      </a:srgbClr>
-                    </a:solidFill>
-                    <a:ea typeface="Segoe UI" pitchFamily="34" charset="0"/>
-                    <a:cs typeface="Segoe UI" pitchFamily="34" charset="0"/>
-                  </a:rPr>
-                  <a:t>years</a:t>
-                </a:r>
-                <a:endParaRPr lang="en-US" sz="1400" spc="-95" dirty="0">
-                  <a:solidFill>
-                    <a:srgbClr val="FFFFFF">
-                      <a:alpha val="99000"/>
-                    </a:srgbClr>
-                  </a:solidFill>
-                  <a:ea typeface="Segoe UI" pitchFamily="34" charset="0"/>
-                  <a:cs typeface="Segoe UI" pitchFamily="34" charset="0"/>
-                </a:endParaRPr>
               </a:p>
             </p:txBody>
           </p:sp>
@@ -14113,13 +13825,6 @@
   <p:transition>
     <p:fade/>
   </p:transition>
-  <p:timing>
-    <p:tnLst>
-      <p:par>
-        <p:cTn id="1" dur="indefinite" restart="never" nodeType="tmRoot"/>
-      </p:par>
-    </p:tnLst>
-  </p:timing>
 </p:sld>
 </file>
 
@@ -14156,10 +13861,9 @@
           <a:lstStyle/>
           <a:p>
             <a:r>
-              <a:rPr lang="en-US" dirty="0" smtClean="0"/>
+              <a:rPr lang="en-US" dirty="0"/>
               <a:t>Azure HDInsight</a:t>
             </a:r>
-            <a:endParaRPr lang="en-US" dirty="0"/>
           </a:p>
         </p:txBody>
       </p:sp>
@@ -14184,67 +13888,47 @@
           <a:lstStyle/>
           <a:p>
             <a:r>
-              <a:rPr lang="en-US" dirty="0" smtClean="0"/>
+              <a:rPr lang="en-US" dirty="0"/>
               <a:t>Microsoft Azure’s big-data solution using Hadoop</a:t>
             </a:r>
           </a:p>
           <a:p>
             <a:pPr lvl="1"/>
             <a:r>
-              <a:rPr lang="en-US" dirty="0" smtClean="0"/>
-              <a:t>Open-source framework for storing </a:t>
-            </a:r>
-            <a:r>
               <a:rPr lang="en-US" dirty="0"/>
-              <a:t>and analyzing massive amounts of </a:t>
-            </a:r>
-            <a:r>
-              <a:rPr lang="en-US" dirty="0" smtClean="0"/>
-              <a:t>data on clusters built from commodity hardware</a:t>
+              <a:t>Open-source framework for storing and analyzing massive amounts of data on clusters built from commodity hardware</a:t>
             </a:r>
           </a:p>
           <a:p>
             <a:pPr lvl="1"/>
             <a:r>
-              <a:rPr lang="en-US" dirty="0" smtClean="0"/>
+              <a:rPr lang="en-US" dirty="0"/>
               <a:t>Uses Hadoop Distributed File System (HDFS) for storage</a:t>
             </a:r>
           </a:p>
           <a:p>
             <a:r>
-              <a:rPr lang="en-US" dirty="0" smtClean="0"/>
-              <a:t>Employs the open-source Hortonworks</a:t>
-            </a:r>
-            <a:r>
               <a:rPr lang="en-US" dirty="0"/>
-              <a:t> </a:t>
-            </a:r>
-            <a:r>
-              <a:rPr lang="en-US" dirty="0" smtClean="0"/>
-              <a:t>Data Platform implementation of Hadoop</a:t>
+              <a:t>Employs the open-source Hortonworks Data Platform implementation of Hadoop</a:t>
             </a:r>
           </a:p>
           <a:p>
             <a:pPr lvl="1"/>
             <a:r>
               <a:rPr lang="en-US" dirty="0"/>
-              <a:t>Includes Hive, Pig, Storm, Spark, and </a:t>
-            </a:r>
-            <a:r>
-              <a:rPr lang="en-US" dirty="0" smtClean="0"/>
-              <a:t>more</a:t>
-            </a:r>
-          </a:p>
-          <a:p>
-            <a:r>
-              <a:rPr lang="en-US" dirty="0" smtClean="0"/>
+              <a:t>Includes Hive, Pig, Storm, Spark, and more</a:t>
+            </a:r>
+          </a:p>
+          <a:p>
+            <a:r>
+              <a:rPr lang="en-US" dirty="0"/>
               <a:t>Integrates with popular BI tools </a:t>
             </a:r>
           </a:p>
           <a:p>
             <a:pPr lvl="1"/>
             <a:r>
-              <a:rPr lang="en-US" dirty="0" smtClean="0"/>
+              <a:rPr lang="en-US" dirty="0"/>
               <a:t>Includes Power BI, Excel, SSAS, SSRS, Tableau</a:t>
             </a:r>
           </a:p>
@@ -14293,13 +13977,6 @@
   <p:transition>
     <p:fade/>
   </p:transition>
-  <p:timing>
-    <p:tnLst>
-      <p:par>
-        <p:cTn id="1" dur="indefinite" restart="never" nodeType="tmRoot"/>
-      </p:par>
-    </p:tnLst>
-  </p:timing>
 </p:sld>
 </file>
 
@@ -14336,10 +14013,9 @@
           <a:lstStyle/>
           <a:p>
             <a:r>
-              <a:rPr lang="en-US" dirty="0" smtClean="0"/>
+              <a:rPr lang="en-US" dirty="0"/>
               <a:t>Why Hadoop on Azure?</a:t>
             </a:r>
-            <a:endParaRPr lang="en-US" dirty="0"/>
           </a:p>
         </p:txBody>
       </p:sp>
@@ -14364,27 +14040,27 @@
           <a:lstStyle/>
           <a:p>
             <a:r>
-              <a:rPr lang="en-US" dirty="0" smtClean="0"/>
+              <a:rPr lang="en-US" dirty="0"/>
               <a:t>Automatic cluster provisioning &amp; configuration</a:t>
             </a:r>
           </a:p>
           <a:p>
             <a:pPr lvl="1"/>
             <a:r>
-              <a:rPr lang="en-US" dirty="0" smtClean="0"/>
+              <a:rPr lang="en-US" dirty="0"/>
               <a:t>Bypass an otherwise manual-intensive process</a:t>
             </a:r>
           </a:p>
           <a:p>
             <a:r>
-              <a:rPr lang="en-US" dirty="0" smtClean="0"/>
+              <a:rPr lang="en-US" dirty="0"/>
               <a:t>Cluster scaling</a:t>
             </a:r>
           </a:p>
           <a:p>
             <a:pPr lvl="1"/>
             <a:r>
-              <a:rPr lang="en-US" dirty="0" smtClean="0"/>
+              <a:rPr lang="en-US" dirty="0"/>
               <a:t>Change number of nodes without deleting/re-creating the cluster</a:t>
             </a:r>
           </a:p>
@@ -14397,31 +14073,27 @@
           <a:p>
             <a:pPr lvl="1"/>
             <a:r>
-              <a:rPr lang="en-US" dirty="0" smtClean="0"/>
+              <a:rPr lang="en-US" dirty="0"/>
               <a:t>Managed solution - 99.9% SLA</a:t>
             </a:r>
           </a:p>
           <a:p>
             <a:pPr lvl="1"/>
             <a:r>
-              <a:rPr lang="en-US" dirty="0" smtClean="0"/>
-              <a:t>HDInsight </a:t>
-            </a:r>
-            <a:r>
               <a:rPr lang="en-US" dirty="0"/>
-              <a:t>includes a secondary head node</a:t>
-            </a:r>
-          </a:p>
-          <a:p>
-            <a:r>
-              <a:rPr lang="en-US" dirty="0" smtClean="0"/>
+              <a:t>HDInsight includes a secondary head node</a:t>
+            </a:r>
+          </a:p>
+          <a:p>
+            <a:r>
+              <a:rPr lang="en-US" dirty="0"/>
               <a:t>Reliable and economical storage</a:t>
             </a:r>
           </a:p>
           <a:p>
             <a:pPr lvl="1"/>
             <a:r>
-              <a:rPr lang="en-US" dirty="0" smtClean="0"/>
+              <a:rPr lang="en-US" dirty="0"/>
               <a:t>HDFS mapped over Azure Blob Storage</a:t>
             </a:r>
           </a:p>
@@ -14437,13 +14109,8 @@
             </a:r>
             <a:r>
               <a:rPr lang="en-US" dirty="0"/>
-              <a:t>://” protocol </a:t>
-            </a:r>
-            <a:r>
-              <a:rPr lang="en-US" dirty="0" smtClean="0"/>
-              <a:t>prefix</a:t>
-            </a:r>
-            <a:endParaRPr lang="en-US" dirty="0"/>
+              <a:t>://” protocol prefix</a:t>
+            </a:r>
           </a:p>
         </p:txBody>
       </p:sp>
@@ -14460,13 +14127,6 @@
   <p:transition>
     <p:fade/>
   </p:transition>
-  <p:timing>
-    <p:tnLst>
-      <p:par>
-        <p:cTn id="1" dur="indefinite" restart="never" nodeType="tmRoot"/>
-      </p:par>
-    </p:tnLst>
-  </p:timing>
 </p:sld>
 </file>
 
@@ -14503,10 +14163,9 @@
           <a:lstStyle/>
           <a:p>
             <a:r>
-              <a:rPr lang="en-US" dirty="0" smtClean="0"/>
+              <a:rPr lang="en-US" dirty="0"/>
               <a:t>HDInsight Cluster Types</a:t>
             </a:r>
-            <a:endParaRPr lang="en-US" dirty="0"/>
           </a:p>
         </p:txBody>
       </p:sp>
@@ -14531,73 +14190,65 @@
           <a:lstStyle/>
           <a:p>
             <a:r>
-              <a:rPr lang="en-US" sz="3200" dirty="0" smtClean="0"/>
+              <a:rPr lang="en-US" sz="3200" dirty="0"/>
               <a:t>Hadoop: Query workloads</a:t>
             </a:r>
           </a:p>
           <a:p>
             <a:pPr lvl="1"/>
             <a:r>
-              <a:rPr lang="en-US" sz="2800" dirty="0" smtClean="0"/>
+              <a:rPr lang="en-US" sz="2800" dirty="0"/>
               <a:t>Reliable data storage, simple MapReduce</a:t>
             </a:r>
           </a:p>
           <a:p>
             <a:r>
-              <a:rPr lang="en-US" sz="3200" dirty="0" err="1" smtClean="0"/>
+              <a:rPr lang="en-US" sz="3200" dirty="0" err="1"/>
               <a:t>HBase</a:t>
             </a:r>
             <a:r>
-              <a:rPr lang="en-US" sz="3200" dirty="0" smtClean="0"/>
+              <a:rPr lang="en-US" sz="3200" dirty="0"/>
               <a:t>: NoSQL workloads</a:t>
             </a:r>
           </a:p>
           <a:p>
             <a:pPr lvl="1"/>
             <a:r>
-              <a:rPr lang="en-US" sz="2800" dirty="0" smtClean="0"/>
+              <a:rPr lang="en-US" sz="2800" dirty="0"/>
               <a:t>Distributed database offering random access to large amounts of data</a:t>
             </a:r>
           </a:p>
           <a:p>
             <a:r>
-              <a:rPr lang="en-US" sz="3200" dirty="0" smtClean="0"/>
+              <a:rPr lang="en-US" sz="3200" dirty="0"/>
               <a:t>Apache Storm: Stream workloads</a:t>
             </a:r>
           </a:p>
           <a:p>
             <a:pPr lvl="1"/>
             <a:r>
-              <a:rPr lang="en-US" sz="2800" dirty="0" smtClean="0"/>
+              <a:rPr lang="en-US" sz="2800" dirty="0"/>
               <a:t>Real-time analysis of moving data streams</a:t>
             </a:r>
           </a:p>
           <a:p>
             <a:r>
-              <a:rPr lang="en-US" sz="3200" dirty="0" smtClean="0"/>
+              <a:rPr lang="en-US" sz="3200" dirty="0"/>
               <a:t>Apache Spark: High-performance workloads</a:t>
             </a:r>
           </a:p>
           <a:p>
             <a:pPr lvl="1"/>
             <a:r>
-              <a:rPr lang="en-US" sz="2800" dirty="0" smtClean="0"/>
-              <a:t>In-memory </a:t>
-            </a:r>
-            <a:r>
               <a:rPr lang="en-US" sz="2800" dirty="0"/>
-              <a:t>p</a:t>
-            </a:r>
-            <a:r>
-              <a:rPr lang="en-US" sz="2800" dirty="0" smtClean="0"/>
-              <a:t>arallel processing</a:t>
+              <a:t>In-memory parallel processing</a:t>
             </a:r>
           </a:p>
         </p:txBody>
       </p:sp>
       <p:pic>
         <p:nvPicPr>
-          <p:cNvPr id="5" name="Picture 4"/>
+          <p:cNvPr id="6" name="Picture 5"/>
           <p:cNvPicPr>
             <a:picLocks noChangeAspect="1"/>
           </p:cNvPicPr>
@@ -14605,13 +14256,13 @@
         </p:nvPicPr>
         <p:blipFill rotWithShape="1">
           <a:blip r:embed="rId3"/>
-          <a:srcRect r="45450"/>
+          <a:srcRect r="29976"/>
           <a:stretch/>
         </p:blipFill>
         <p:spPr>
           <a:xfrm>
-            <a:off x="9072881" y="1447800"/>
-            <a:ext cx="2976880" cy="4685714"/>
+            <a:off x="9072880" y="1447800"/>
+            <a:ext cx="2976881" cy="4869398"/>
           </a:xfrm>
           <a:prstGeom prst="rect">
             <a:avLst/>
@@ -14636,13 +14287,6 @@
   <p:transition>
     <p:fade/>
   </p:transition>
-  <p:timing>
-    <p:tnLst>
-      <p:par>
-        <p:cTn id="1" dur="indefinite" restart="never" nodeType="tmRoot"/>
-      </p:par>
-    </p:tnLst>
-  </p:timing>
 </p:sld>
 </file>
 
@@ -14679,10 +14323,9 @@
           <a:lstStyle/>
           <a:p>
             <a:r>
-              <a:rPr lang="en-US" dirty="0" smtClean="0"/>
+              <a:rPr lang="en-US" dirty="0"/>
               <a:t>Apache Spark</a:t>
             </a:r>
-            <a:endParaRPr lang="en-US" dirty="0"/>
           </a:p>
         </p:txBody>
       </p:sp>
@@ -14708,24 +14351,15 @@
           <a:p>
             <a:r>
               <a:rPr lang="en-US" sz="2800" dirty="0"/>
-              <a:t>Interactive manipulation and visualization of </a:t>
-            </a:r>
-            <a:r>
-              <a:rPr lang="en-US" sz="2800" dirty="0" smtClean="0"/>
-              <a:t>data</a:t>
+              <a:t>Interactive manipulation and visualization of data</a:t>
             </a:r>
           </a:p>
           <a:p>
             <a:pPr lvl="1"/>
             <a:r>
               <a:rPr lang="en-US" sz="2400" dirty="0"/>
-              <a:t>Scala, Python, and R </a:t>
-            </a:r>
-            <a:r>
-              <a:rPr lang="en-US" sz="2400" dirty="0" smtClean="0"/>
-              <a:t>Interactive Shells</a:t>
-            </a:r>
-            <a:endParaRPr lang="en-US" sz="2400" dirty="0"/>
+              <a:t>Scala, Python, and R Interactive Shells</a:t>
+            </a:r>
           </a:p>
           <a:p>
             <a:pPr lvl="1"/>
@@ -14738,57 +14372,56 @@
               <a:t> Notebook with </a:t>
             </a:r>
             <a:r>
-              <a:rPr lang="en-US" sz="2400" dirty="0" err="1" smtClean="0"/>
+              <a:rPr lang="en-US" sz="2400" dirty="0" err="1"/>
               <a:t>PySpark</a:t>
             </a:r>
             <a:r>
-              <a:rPr lang="en-US" sz="2400" dirty="0" smtClean="0"/>
+              <a:rPr lang="en-US" sz="2400" dirty="0"/>
               <a:t> (Python) and Spark (Scala) kernels provide in-browser interaction</a:t>
             </a:r>
           </a:p>
           <a:p>
             <a:r>
-              <a:rPr lang="en-US" sz="2800" dirty="0" smtClean="0"/>
+              <a:rPr lang="en-US" sz="2800" dirty="0"/>
               <a:t>Unified platform for processing multiple workloads</a:t>
             </a:r>
           </a:p>
           <a:p>
             <a:pPr lvl="1"/>
             <a:r>
-              <a:rPr lang="en-US" sz="2400" dirty="0" smtClean="0"/>
+              <a:rPr lang="en-US" sz="2400" dirty="0"/>
               <a:t>Real-time processing, Machine Learning, Stream Analytics, Interactive Querying, Graphing</a:t>
             </a:r>
-            <a:endParaRPr lang="en-US" sz="2400" dirty="0"/>
-          </a:p>
-          <a:p>
-            <a:r>
-              <a:rPr lang="en-US" sz="2800" dirty="0" smtClean="0"/>
+          </a:p>
+          <a:p>
+            <a:r>
+              <a:rPr lang="en-US" sz="2800" dirty="0"/>
               <a:t>Leverages in-memory processing for really big data</a:t>
             </a:r>
           </a:p>
           <a:p>
             <a:pPr lvl="1"/>
             <a:r>
-              <a:rPr lang="en-US" sz="2400" dirty="0" smtClean="0"/>
+              <a:rPr lang="en-US" sz="2400" dirty="0"/>
               <a:t>Resilient distributed datasets (RDDs)</a:t>
             </a:r>
           </a:p>
           <a:p>
             <a:pPr lvl="1"/>
             <a:r>
-              <a:rPr lang="en-US" sz="2400" dirty="0" smtClean="0"/>
+              <a:rPr lang="en-US" sz="2400" dirty="0"/>
               <a:t>APIs for processing large datasets</a:t>
             </a:r>
           </a:p>
           <a:p>
             <a:pPr lvl="1"/>
             <a:r>
-              <a:rPr lang="en-US" sz="2400" dirty="0" smtClean="0"/>
+              <a:rPr lang="en-US" sz="2400" dirty="0"/>
               <a:t>Up to 100x faster than Hadoop</a:t>
             </a:r>
           </a:p>
           <a:p>
-            <a:endParaRPr lang="en-US" dirty="0" smtClean="0"/>
+            <a:endParaRPr lang="en-US" dirty="0"/>
           </a:p>
         </p:txBody>
       </p:sp>
@@ -14835,13 +14468,6 @@
   <p:transition>
     <p:fade/>
   </p:transition>
-  <p:timing>
-    <p:tnLst>
-      <p:par>
-        <p:cTn id="1" dur="indefinite" restart="never" nodeType="tmRoot"/>
-      </p:par>
-    </p:tnLst>
-  </p:timing>
 </p:sld>
 </file>
 
@@ -14878,10 +14504,9 @@
           <a:lstStyle/>
           <a:p>
             <a:r>
-              <a:rPr lang="en-US" dirty="0" smtClean="0"/>
+              <a:rPr lang="en-US" dirty="0"/>
               <a:t>Spark Components on HDInsight</a:t>
             </a:r>
-            <a:endParaRPr lang="en-US" dirty="0"/>
           </a:p>
         </p:txBody>
       </p:sp>
@@ -14906,58 +14531,57 @@
           <a:lstStyle/>
           <a:p>
             <a:r>
-              <a:rPr lang="en-US" dirty="0" smtClean="0"/>
+              <a:rPr lang="en-US" dirty="0"/>
               <a:t>Spark Core</a:t>
             </a:r>
           </a:p>
           <a:p>
             <a:pPr lvl="1"/>
             <a:r>
-              <a:rPr lang="en-US" dirty="0" smtClean="0"/>
+              <a:rPr lang="en-US" dirty="0"/>
               <a:t>Includes Spark SQL, Spark Streaming, </a:t>
             </a:r>
             <a:r>
-              <a:rPr lang="en-US" dirty="0" err="1" smtClean="0"/>
+              <a:rPr lang="en-US" dirty="0" err="1"/>
               <a:t>GraphX</a:t>
             </a:r>
             <a:r>
-              <a:rPr lang="en-US" dirty="0" smtClean="0"/>
+              <a:rPr lang="en-US" dirty="0"/>
               <a:t>, and </a:t>
             </a:r>
             <a:r>
-              <a:rPr lang="en-US" dirty="0" err="1" smtClean="0"/>
+              <a:rPr lang="en-US" dirty="0" err="1"/>
               <a:t>MLlib</a:t>
             </a:r>
-            <a:endParaRPr lang="en-US" dirty="0" smtClean="0"/>
-          </a:p>
-          <a:p>
-            <a:r>
-              <a:rPr lang="en-US" dirty="0" smtClean="0"/>
+            <a:endParaRPr lang="en-US" dirty="0"/>
+          </a:p>
+          <a:p>
+            <a:r>
+              <a:rPr lang="en-US" dirty="0"/>
               <a:t>Anaconda</a:t>
             </a:r>
           </a:p>
           <a:p>
             <a:r>
-              <a:rPr lang="en-US" dirty="0" smtClean="0"/>
+              <a:rPr lang="en-US" dirty="0"/>
               <a:t>Livy</a:t>
             </a:r>
           </a:p>
           <a:p>
             <a:r>
-              <a:rPr lang="en-US" dirty="0" err="1" smtClean="0"/>
+              <a:rPr lang="en-US" dirty="0" err="1"/>
               <a:t>Jupyter</a:t>
             </a:r>
             <a:r>
-              <a:rPr lang="en-US" dirty="0" smtClean="0"/>
+              <a:rPr lang="en-US" dirty="0"/>
               <a:t> Notebooks</a:t>
             </a:r>
           </a:p>
           <a:p>
             <a:r>
-              <a:rPr lang="en-US" dirty="0" smtClean="0"/>
+              <a:rPr lang="en-US" dirty="0"/>
               <a:t>ODBC Driver for connecting from BI tools (Power BI, Tableau)</a:t>
             </a:r>
-            <a:endParaRPr lang="en-US" dirty="0"/>
           </a:p>
         </p:txBody>
       </p:sp>
@@ -15004,13 +14628,6 @@
   <p:transition>
     <p:fade/>
   </p:transition>
-  <p:timing>
-    <p:tnLst>
-      <p:par>
-        <p:cTn id="1" dur="indefinite" restart="never" nodeType="tmRoot"/>
-      </p:par>
-    </p:tnLst>
-  </p:timing>
 </p:sld>
 </file>
 
@@ -15047,14 +14664,13 @@
           <a:lstStyle/>
           <a:p>
             <a:r>
-              <a:rPr lang="en-US" dirty="0" err="1" smtClean="0"/>
+              <a:rPr lang="en-US" dirty="0" err="1"/>
               <a:t>Jupyter</a:t>
             </a:r>
             <a:r>
-              <a:rPr lang="en-US" dirty="0" smtClean="0"/>
+              <a:rPr lang="en-US" dirty="0"/>
               <a:t> Notebooks on HDInsight</a:t>
             </a:r>
-            <a:endParaRPr lang="en-US" dirty="0"/>
           </a:p>
         </p:txBody>
       </p:sp>
@@ -15079,32 +14695,31 @@
           <a:lstStyle/>
           <a:p>
             <a:r>
-              <a:rPr lang="en-US" sz="2800" dirty="0" smtClean="0"/>
+              <a:rPr lang="en-US" sz="2800" dirty="0"/>
               <a:t>Provide a browser-based interface for working with text, code, equations, plots, graphics, and interactive controls in a single document.</a:t>
             </a:r>
           </a:p>
           <a:p>
             <a:r>
-              <a:rPr lang="en-US" sz="2800" dirty="0" smtClean="0"/>
+              <a:rPr lang="en-US" sz="2800" dirty="0"/>
               <a:t>Include preset Spark &amp; Hive contexts (</a:t>
             </a:r>
             <a:r>
-              <a:rPr lang="en-US" sz="2800" dirty="0" err="1" smtClean="0"/>
+              <a:rPr lang="en-US" sz="2800" dirty="0" err="1"/>
               <a:t>sc</a:t>
             </a:r>
             <a:r>
-              <a:rPr lang="en-US" sz="2800" dirty="0" smtClean="0"/>
+              <a:rPr lang="en-US" sz="2800" dirty="0"/>
               <a:t> &amp; </a:t>
             </a:r>
             <a:r>
-              <a:rPr lang="en-US" sz="2800" dirty="0" err="1" smtClean="0"/>
+              <a:rPr lang="en-US" sz="2800" dirty="0" err="1"/>
               <a:t>sqlContext</a:t>
             </a:r>
             <a:r>
-              <a:rPr lang="en-US" sz="2800" dirty="0" smtClean="0"/>
+              <a:rPr lang="en-US" sz="2800" dirty="0"/>
               <a:t>, respectively)</a:t>
             </a:r>
-            <a:endParaRPr lang="en-US" sz="2800" dirty="0"/>
           </a:p>
         </p:txBody>
       </p:sp>
@@ -15149,13 +14764,6 @@
   <p:transition>
     <p:fade/>
   </p:transition>
-  <p:timing>
-    <p:tnLst>
-      <p:par>
-        <p:cTn id="1" dur="indefinite" restart="never" nodeType="tmRoot"/>
-      </p:par>
-    </p:tnLst>
-  </p:timing>
 </p:sld>
 </file>
 
@@ -15192,10 +14800,9 @@
           <a:lstStyle/>
           <a:p>
             <a:r>
-              <a:rPr lang="en-US" dirty="0" smtClean="0"/>
+              <a:rPr lang="en-US" dirty="0"/>
               <a:t>Items of Note About HDInsight</a:t>
             </a:r>
-            <a:endParaRPr lang="en-US" dirty="0"/>
           </a:p>
         </p:txBody>
       </p:sp>
@@ -15220,25 +14827,16 @@
           <a:lstStyle/>
           <a:p>
             <a:r>
-              <a:rPr lang="en-US" dirty="0" smtClean="0"/>
+              <a:rPr lang="en-US" dirty="0"/>
               <a:t>There is no “suspend” on HDInsight clusters</a:t>
             </a:r>
           </a:p>
           <a:p>
             <a:pPr lvl="1"/>
             <a:r>
-              <a:rPr lang="en-US" dirty="0" smtClean="0"/>
-              <a:t>Provision </a:t>
-            </a:r>
-            <a:r>
               <a:rPr lang="en-US" dirty="0"/>
-              <a:t>the cluster, do work, </a:t>
-            </a:r>
-            <a:r>
-              <a:rPr lang="en-US" dirty="0" smtClean="0"/>
-              <a:t>then delete the cluster to avoid unnecessary charges</a:t>
-            </a:r>
-            <a:endParaRPr lang="en-US" dirty="0"/>
+              <a:t>Provision the cluster, do work, then delete the cluster to avoid unnecessary charges</a:t>
+            </a:r>
           </a:p>
           <a:p>
             <a:pPr lvl="1"/>
@@ -15249,18 +14847,14 @@
           </a:p>
           <a:p>
             <a:r>
-              <a:rPr lang="en-US" dirty="0" smtClean="0"/>
-              <a:t>Can </a:t>
-            </a:r>
-            <a:r>
               <a:rPr lang="en-US" dirty="0"/>
-              <a:t>deploy from the portal, but often scripted in practice</a:t>
+              <a:t>Can deploy from the portal, but often scripted in practice</a:t>
             </a:r>
           </a:p>
           <a:p>
             <a:pPr lvl="1"/>
             <a:r>
-              <a:rPr lang="en-US" dirty="0" smtClean="0"/>
+              <a:rPr lang="en-US" dirty="0"/>
               <a:t>Easier/repeatable creation and deletion</a:t>
             </a:r>
           </a:p>
@@ -15279,13 +14873,6 @@
   <p:transition>
     <p:fade/>
   </p:transition>
-  <p:timing>
-    <p:tnLst>
-      <p:par>
-        <p:cTn id="1" dur="indefinite" restart="never" nodeType="tmRoot"/>
-      </p:par>
-    </p:tnLst>
-  </p:timing>
 </p:sld>
 </file>
 

</xml_diff>